<commit_message>
Small improvements for ppt
</commit_message>
<xml_diff>
--- a/doc/presi.pptx
+++ b/doc/presi.pptx
@@ -5,7 +5,7 @@
     <p:sldMasterId id="2147483648" r:id="rId1"/>
   </p:sldMasterIdLst>
   <p:notesMasterIdLst>
-    <p:notesMasterId r:id="rId8"/>
+    <p:notesMasterId r:id="rId7"/>
   </p:notesMasterIdLst>
   <p:sldIdLst>
     <p:sldId id="264" r:id="rId2"/>
@@ -13,7 +13,6 @@
     <p:sldId id="265" r:id="rId4"/>
     <p:sldId id="267" r:id="rId5"/>
     <p:sldId id="268" r:id="rId6"/>
-    <p:sldId id="263" r:id="rId7"/>
   </p:sldIdLst>
   <p:sldSz cx="12192000" cy="6858000"/>
   <p:notesSz cx="6858000" cy="9144000"/>
@@ -114,7 +113,7 @@
   </p:defaultTextStyle>
   <p:extLst>
     <p:ext uri="{EFAFB233-063F-42B5-8137-9DF3F51BA10A}">
-      <p15:sldGuideLst xmlns:p15="http://schemas.microsoft.com/office/powerpoint/2012/main"/>
+      <p15:sldGuideLst xmlns:p15="http://schemas.microsoft.com/office/powerpoint/2012/main" xmlns=""/>
     </p:ext>
   </p:extLst>
 </p:presentation>
@@ -202,7 +201,7 @@
           <a:p>
             <a:fld id="{6AF94BCA-FBB2-4176-8AFF-58A776930FFF}" type="datetimeFigureOut">
               <a:rPr lang="en-US" smtClean="0"/>
-              <a:t>5/5/2015</a:t>
+              <a:t>05.05.15</a:t>
             </a:fld>
             <a:endParaRPr lang="en-US"/>
           </a:p>
@@ -832,7 +831,7 @@
           <a:p>
             <a:fld id="{1CF3EE73-6B35-4027-97A2-75181844DD14}" type="datetime1">
               <a:rPr lang="en-US" smtClean="0"/>
-              <a:t>5/5/2015</a:t>
+              <a:t>05.05.15</a:t>
             </a:fld>
             <a:endParaRPr lang="en-US"/>
           </a:p>
@@ -931,7 +930,7 @@
           <a:p>
             <a:fld id="{78D5AE88-ACE8-48EB-8F74-0D537439F5C6}" type="datetime1">
               <a:rPr lang="en-US" smtClean="0"/>
-              <a:t>5/5/2015</a:t>
+              <a:t>05.05.15</a:t>
             </a:fld>
             <a:endParaRPr lang="en-US"/>
           </a:p>
@@ -1115,7 +1114,7 @@
           <a:p>
             <a:fld id="{90F9ECD0-96CA-457E-91CB-CC62F1F74119}" type="datetime1">
               <a:rPr lang="en-US" smtClean="0"/>
-              <a:t>5/5/2015</a:t>
+              <a:t>05.05.15</a:t>
             </a:fld>
             <a:endParaRPr lang="en-US"/>
           </a:p>
@@ -1365,7 +1364,7 @@
           <a:p>
             <a:fld id="{70F2A4AB-53A9-4083-9CD6-6A2A16A11751}" type="datetime1">
               <a:rPr lang="en-US" smtClean="0"/>
-              <a:t>5/5/2015</a:t>
+              <a:t>05.05.15</a:t>
             </a:fld>
             <a:endParaRPr lang="en-US"/>
           </a:p>
@@ -1629,7 +1628,7 @@
           <a:p>
             <a:fld id="{62951C73-E50E-4DBC-86A2-C7919B81B72E}" type="datetime1">
               <a:rPr lang="en-US" smtClean="0"/>
-              <a:t>5/5/2015</a:t>
+              <a:t>05.05.15</a:t>
             </a:fld>
             <a:endParaRPr lang="en-US"/>
           </a:p>
@@ -1813,7 +1812,7 @@
           <a:p>
             <a:fld id="{4EDD421F-79C3-4250-9DC9-989DC9016631}" type="datetime1">
               <a:rPr lang="en-US" smtClean="0"/>
-              <a:t>5/5/2015</a:t>
+              <a:t>05.05.15</a:t>
             </a:fld>
             <a:endParaRPr lang="en-US"/>
           </a:p>
@@ -1987,7 +1986,7 @@
           <a:p>
             <a:fld id="{0E228137-ECE8-4C00-AA17-87BDEBECA771}" type="datetime1">
               <a:rPr lang="en-US" smtClean="0"/>
-              <a:t>5/5/2015</a:t>
+              <a:t>05.05.15</a:t>
             </a:fld>
             <a:endParaRPr lang="en-US"/>
           </a:p>
@@ -2128,7 +2127,7 @@
           <a:p>
             <a:fld id="{9381A38A-45DF-4069-A5DD-0A57AA9377AA}" type="datetime1">
               <a:rPr lang="en-US" smtClean="0"/>
-              <a:t>5/5/2015</a:t>
+              <a:t>05.05.15</a:t>
             </a:fld>
             <a:endParaRPr lang="en-US"/>
           </a:p>
@@ -2957,7 +2956,7 @@
           <a:p>
             <a:fld id="{25052F36-0F95-4DF2-B41C-DCB1B55CC606}" type="datetime1">
               <a:rPr lang="en-US" smtClean="0"/>
-              <a:t>5/5/2015</a:t>
+              <a:t>05.05.15</a:t>
             </a:fld>
             <a:endParaRPr lang="en-US"/>
           </a:p>
@@ -3300,7 +3299,7 @@
           <a:p>
             <a:fld id="{FF650FB3-3A8A-4AF2-A37D-E3749780F301}" type="datetime1">
               <a:rPr lang="en-US" smtClean="0"/>
-              <a:t>5/5/2015</a:t>
+              <a:t>05.05.15</a:t>
             </a:fld>
             <a:endParaRPr lang="en-US"/>
           </a:p>
@@ -3605,7 +3604,7 @@
           <a:p>
             <a:fld id="{9EFAC11E-3BFF-4DB2-93CE-C3BE64B61F57}" type="datetime1">
               <a:rPr lang="en-US" smtClean="0"/>
-              <a:t>5/5/2015</a:t>
+              <a:t>05.05.15</a:t>
             </a:fld>
             <a:endParaRPr lang="en-US" dirty="0"/>
           </a:p>
@@ -4166,7 +4165,7 @@
   <p:timing>
     <p:tnLst>
       <p:par>
-        <p:cTn id="1" dur="indefinite" restart="never" nodeType="tmRoot"/>
+        <p:cTn xmlns:p14="http://schemas.microsoft.com/office/powerpoint/2010/main" id="1" dur="indefinite" restart="never" nodeType="tmRoot"/>
       </p:par>
     </p:tnLst>
   </p:timing>
@@ -4200,7 +4199,12 @@
             <p:ph type="title"/>
           </p:nvPr>
         </p:nvSpPr>
-        <p:spPr/>
+        <p:spPr>
+          <a:xfrm>
+            <a:off x="270240" y="0"/>
+            <a:ext cx="11651521" cy="1035895"/>
+          </a:xfrm>
+        </p:spPr>
         <p:txBody>
           <a:bodyPr/>
           <a:lstStyle/>
@@ -4313,17 +4317,41 @@
             </a:r>
             <a:r>
               <a:rPr lang="en-US" dirty="0"/>
-              <a:t>: A universal background subtraction algorithm for video sequences." </a:t>
+              <a:t>: A universal background subtraction algorithm for video sequences</a:t>
+            </a:r>
+            <a:r>
+              <a:rPr lang="en-US" dirty="0" smtClean="0"/>
+              <a:t>.” </a:t>
+            </a:r>
+            <a:br>
+              <a:rPr lang="en-US" dirty="0" smtClean="0"/>
+            </a:br>
+            <a:r>
+              <a:rPr lang="en-US" sz="1200" i="1" kern="1200" dirty="0" smtClean="0">
+                <a:solidFill>
+                  <a:schemeClr val="accent1">
+                    <a:lumMod val="75000"/>
+                  </a:schemeClr>
+                </a:solidFill>
+                <a:effectLst/>
+                <a:latin typeface="+mn-lt"/>
+                <a:ea typeface="+mn-ea"/>
+                <a:cs typeface="+mn-cs"/>
+              </a:rPr>
+              <a:t>IEEE Transactions on</a:t>
+            </a:r>
+            <a:r>
+              <a:rPr lang="en-US" dirty="0"/>
+              <a:t> </a:t>
             </a:r>
             <a:r>
               <a:rPr lang="en-US" i="1" dirty="0"/>
-              <a:t>Image Processing, IEEE Transactions on</a:t>
+              <a:t>Image Processing, </a:t>
             </a:r>
             <a:r>
               <a:rPr lang="en-US" dirty="0"/>
               <a:t> 20.6 (2011): 1709-1724.</a:t>
             </a:r>
-            <a:endParaRPr lang="en-US" dirty="0"/>
           </a:p>
         </p:txBody>
       </p:sp>
@@ -4351,8 +4379,21 @@
             <a:pPr lvl="1"/>
             <a:r>
               <a:rPr lang="en-US" dirty="0"/>
-              <a:t>Color mean and variance</a:t>
-            </a:r>
+              <a:t>Color </a:t>
+            </a:r>
+            <a:r>
+              <a:rPr lang="en-US" dirty="0" smtClean="0"/>
+              <a:t>Mean </a:t>
+            </a:r>
+            <a:r>
+              <a:rPr lang="en-US" dirty="0"/>
+              <a:t>and </a:t>
+            </a:r>
+            <a:r>
+              <a:rPr lang="en-US" dirty="0" smtClean="0"/>
+              <a:t>Variance (CMV)</a:t>
+            </a:r>
+            <a:endParaRPr lang="en-US" dirty="0"/>
           </a:p>
           <a:p>
             <a:pPr lvl="1"/>
@@ -4371,6 +4412,189 @@
               <a:rPr lang="en-US" dirty="0"/>
               <a:t>Comparison</a:t>
             </a:r>
+          </a:p>
+        </p:txBody>
+      </p:sp>
+      <p:pic>
+        <p:nvPicPr>
+          <p:cNvPr id="2" name="Picture 1" descr="Seg_S21-2_0120-VIBE.jpeg"/>
+          <p:cNvPicPr>
+            <a:picLocks noChangeAspect="1"/>
+          </p:cNvPicPr>
+          <p:nvPr/>
+        </p:nvPicPr>
+        <p:blipFill>
+          <a:blip r:embed="rId2">
+            <a:extLst>
+              <a:ext uri="{28A0092B-C50C-407E-A947-70E740481C1C}">
+                <a14:useLocalDpi xmlns:a14="http://schemas.microsoft.com/office/drawing/2010/main" val="0"/>
+              </a:ext>
+            </a:extLst>
+          </a:blip>
+          <a:stretch>
+            <a:fillRect/>
+          </a:stretch>
+        </p:blipFill>
+        <p:spPr>
+          <a:xfrm>
+            <a:off x="8836457" y="3249660"/>
+            <a:ext cx="2700000" cy="2160000"/>
+          </a:xfrm>
+          <a:prstGeom prst="rect">
+            <a:avLst/>
+          </a:prstGeom>
+        </p:spPr>
+      </p:pic>
+      <p:pic>
+        <p:nvPicPr>
+          <p:cNvPr id="8" name="Picture 7" descr="S21-2_0120.jpeg"/>
+          <p:cNvPicPr>
+            <a:picLocks noChangeAspect="1"/>
+          </p:cNvPicPr>
+          <p:nvPr/>
+        </p:nvPicPr>
+        <p:blipFill>
+          <a:blip r:embed="rId3">
+            <a:extLst>
+              <a:ext uri="{28A0092B-C50C-407E-A947-70E740481C1C}">
+                <a14:useLocalDpi xmlns:a14="http://schemas.microsoft.com/office/drawing/2010/main" val="0"/>
+              </a:ext>
+            </a:extLst>
+          </a:blip>
+          <a:stretch>
+            <a:fillRect/>
+          </a:stretch>
+        </p:blipFill>
+        <p:spPr>
+          <a:xfrm>
+            <a:off x="3195486" y="3249659"/>
+            <a:ext cx="2700000" cy="2160000"/>
+          </a:xfrm>
+          <a:prstGeom prst="rect">
+            <a:avLst/>
+          </a:prstGeom>
+        </p:spPr>
+      </p:pic>
+      <p:pic>
+        <p:nvPicPr>
+          <p:cNvPr id="9" name="Picture 8" descr="Seg_S21-2_0120-CMV.jpeg"/>
+          <p:cNvPicPr>
+            <a:picLocks noChangeAspect="1"/>
+          </p:cNvPicPr>
+          <p:nvPr/>
+        </p:nvPicPr>
+        <p:blipFill>
+          <a:blip r:embed="rId4">
+            <a:extLst>
+              <a:ext uri="{28A0092B-C50C-407E-A947-70E740481C1C}">
+                <a14:useLocalDpi xmlns:a14="http://schemas.microsoft.com/office/drawing/2010/main" val="0"/>
+              </a:ext>
+            </a:extLst>
+          </a:blip>
+          <a:stretch>
+            <a:fillRect/>
+          </a:stretch>
+        </p:blipFill>
+        <p:spPr>
+          <a:xfrm>
+            <a:off x="6014425" y="3249662"/>
+            <a:ext cx="2700000" cy="2160000"/>
+          </a:xfrm>
+          <a:prstGeom prst="rect">
+            <a:avLst/>
+          </a:prstGeom>
+        </p:spPr>
+      </p:pic>
+      <p:sp>
+        <p:nvSpPr>
+          <p:cNvPr id="10" name="TextBox 9"/>
+          <p:cNvSpPr txBox="1"/>
+          <p:nvPr/>
+        </p:nvSpPr>
+        <p:spPr>
+          <a:xfrm>
+            <a:off x="3183827" y="2888991"/>
+            <a:ext cx="2700887" cy="369332"/>
+          </a:xfrm>
+          <a:prstGeom prst="rect">
+            <a:avLst/>
+          </a:prstGeom>
+          <a:noFill/>
+        </p:spPr>
+        <p:txBody>
+          <a:bodyPr wrap="square" rtlCol="0">
+            <a:spAutoFit/>
+          </a:bodyPr>
+          <a:lstStyle/>
+          <a:p>
+            <a:pPr algn="ctr"/>
+            <a:r>
+              <a:rPr lang="en-US" dirty="0" smtClean="0"/>
+              <a:t>Original</a:t>
+            </a:r>
+            <a:endParaRPr lang="en-US" dirty="0"/>
+          </a:p>
+        </p:txBody>
+      </p:sp>
+      <p:sp>
+        <p:nvSpPr>
+          <p:cNvPr id="11" name="TextBox 10"/>
+          <p:cNvSpPr txBox="1"/>
+          <p:nvPr/>
+        </p:nvSpPr>
+        <p:spPr>
+          <a:xfrm>
+            <a:off x="6010284" y="2889339"/>
+            <a:ext cx="2700887" cy="369332"/>
+          </a:xfrm>
+          <a:prstGeom prst="rect">
+            <a:avLst/>
+          </a:prstGeom>
+          <a:noFill/>
+        </p:spPr>
+        <p:txBody>
+          <a:bodyPr wrap="square" rtlCol="0">
+            <a:spAutoFit/>
+          </a:bodyPr>
+          <a:lstStyle/>
+          <a:p>
+            <a:pPr algn="ctr"/>
+            <a:r>
+              <a:rPr lang="en-US" dirty="0" smtClean="0"/>
+              <a:t>CMV</a:t>
+            </a:r>
+            <a:endParaRPr lang="en-US" dirty="0"/>
+          </a:p>
+        </p:txBody>
+      </p:sp>
+      <p:sp>
+        <p:nvSpPr>
+          <p:cNvPr id="12" name="TextBox 11"/>
+          <p:cNvSpPr txBox="1"/>
+          <p:nvPr/>
+        </p:nvSpPr>
+        <p:spPr>
+          <a:xfrm>
+            <a:off x="8836741" y="2889687"/>
+            <a:ext cx="2700887" cy="369332"/>
+          </a:xfrm>
+          <a:prstGeom prst="rect">
+            <a:avLst/>
+          </a:prstGeom>
+          <a:noFill/>
+        </p:spPr>
+        <p:txBody>
+          <a:bodyPr wrap="square" rtlCol="0">
+            <a:spAutoFit/>
+          </a:bodyPr>
+          <a:lstStyle/>
+          <a:p>
+            <a:pPr algn="ctr"/>
+            <a:r>
+              <a:rPr lang="en-US" dirty="0" err="1" smtClean="0"/>
+              <a:t>ViBe</a:t>
+            </a:r>
+            <a:endParaRPr lang="en-US" dirty="0"/>
           </a:p>
         </p:txBody>
       </p:sp>
@@ -4387,7 +4611,7 @@
   <p:timing>
     <p:tnLst>
       <p:par>
-        <p:cTn id="1" dur="indefinite" restart="never" nodeType="tmRoot"/>
+        <p:cTn xmlns:p14="http://schemas.microsoft.com/office/powerpoint/2010/main" id="1" dur="indefinite" restart="never" nodeType="tmRoot"/>
       </p:par>
     </p:tnLst>
   </p:timing>
@@ -4428,7 +4652,19 @@
           <a:p>
             <a:r>
               <a:rPr lang="en-US" dirty="0" smtClean="0"/>
-              <a:t>Color mean and variance</a:t>
+              <a:t>Color </a:t>
+            </a:r>
+            <a:r>
+              <a:rPr lang="en-US" dirty="0" smtClean="0"/>
+              <a:t>Mean </a:t>
+            </a:r>
+            <a:r>
+              <a:rPr lang="en-US" dirty="0" smtClean="0"/>
+              <a:t>and </a:t>
+            </a:r>
+            <a:r>
+              <a:rPr lang="en-US" dirty="0" smtClean="0"/>
+              <a:t>Variance</a:t>
             </a:r>
             <a:endParaRPr lang="en-US" dirty="0"/>
           </a:p>
@@ -4466,45 +4702,7 @@
                   <a:rPr lang="en-US" b="0" dirty="0" smtClean="0"/>
                   <a:t>nitialization: build </a:t>
                 </a:r>
-                <a14:m>
-                  <m:oMath xmlns:m="http://schemas.openxmlformats.org/officeDocument/2006/math">
-                    <m:r>
-                      <a:rPr lang="en-US" b="0" i="1" smtClean="0">
-                        <a:latin typeface="Cambria Math" panose="02040503050406030204" pitchFamily="18" charset="0"/>
-                      </a:rPr>
-                      <m:t>𝑁</m:t>
-                    </m:r>
-                    <m:d>
-                      <m:dPr>
-                        <m:ctrlPr>
-                          <a:rPr lang="en-US" b="0" i="1" smtClean="0">
-                            <a:latin typeface="Cambria Math" panose="02040503050406030204" pitchFamily="18" charset="0"/>
-                          </a:rPr>
-                        </m:ctrlPr>
-                      </m:dPr>
-                      <m:e>
-                        <m:r>
-                          <a:rPr lang="en-US" b="0" i="1" smtClean="0">
-                            <a:latin typeface="Cambria Math" panose="02040503050406030204" pitchFamily="18" charset="0"/>
-                          </a:rPr>
-                          <m:t>𝜇</m:t>
-                        </m:r>
-                        <m:r>
-                          <a:rPr lang="en-US" b="0" i="1" smtClean="0">
-                            <a:latin typeface="Cambria Math" panose="02040503050406030204" pitchFamily="18" charset="0"/>
-                          </a:rPr>
-                          <m:t>,  </m:t>
-                        </m:r>
-                        <m:r>
-                          <a:rPr lang="en-US" b="0" i="1" smtClean="0">
-                            <a:latin typeface="Cambria Math" panose="02040503050406030204" pitchFamily="18" charset="0"/>
-                          </a:rPr>
-                          <m:t>𝜎</m:t>
-                        </m:r>
-                      </m:e>
-                    </m:d>
-                  </m:oMath>
-                </a14:m>
+                <a14:m/>
                 <a:r>
                   <a:rPr lang="en-US" dirty="0" smtClean="0"/>
                   <a:t> </a:t>
@@ -4520,12 +4718,12 @@
               <a:p>
                 <a:pPr lvl="2"/>
                 <a:r>
-                  <a:rPr lang="en-US" dirty="0" err="1" smtClean="0"/>
-                  <a:t>gaussian</a:t>
+                  <a:rPr lang="en-US" dirty="0" smtClean="0"/>
+                  <a:t>Gaussian </a:t>
                 </a:r>
                 <a:r>
                   <a:rPr lang="en-US" dirty="0" smtClean="0"/>
-                  <a:t> blur</a:t>
+                  <a:t>blur</a:t>
                 </a:r>
               </a:p>
               <a:p>
@@ -4538,28 +4736,7 @@
                   <a:rPr lang="en-US" dirty="0" smtClean="0"/>
                   <a:t>f all color channels cross a threshold </a:t>
                 </a:r>
-                <a14:m>
-                  <m:oMath xmlns:m="http://schemas.openxmlformats.org/officeDocument/2006/math">
-                    <m:r>
-                      <a:rPr lang="en-US" b="0" i="0" smtClean="0">
-                        <a:latin typeface="Cambria Math" panose="02040503050406030204" pitchFamily="18" charset="0"/>
-                      </a:rPr>
-                      <m:t>3.</m:t>
-                    </m:r>
-                    <m:r>
-                      <a:rPr lang="en-US" b="0" i="1" smtClean="0">
-                        <a:latin typeface="Cambria Math" panose="02040503050406030204" pitchFamily="18" charset="0"/>
-                      </a:rPr>
-                      <m:t>5∗</m:t>
-                    </m:r>
-                    <m:r>
-                      <a:rPr lang="en-US" b="0" i="1" smtClean="0">
-                        <a:latin typeface="Cambria Math" panose="02040503050406030204" pitchFamily="18" charset="0"/>
-                      </a:rPr>
-                      <m:t>𝜎</m:t>
-                    </m:r>
-                  </m:oMath>
-                </a14:m>
+                <a14:m/>
                 <a:r>
                   <a:rPr lang="en-US" dirty="0" smtClean="0"/>
                   <a:t> =&gt; foreground</a:t>
@@ -4576,7 +4753,11 @@
                 <a:pPr lvl="2"/>
                 <a:r>
                   <a:rPr lang="en-US" dirty="0" smtClean="0"/>
-                  <a:t>Post process with closing and then contour filling</a:t>
+                  <a:t>post </a:t>
+                </a:r>
+                <a:r>
+                  <a:rPr lang="en-US" dirty="0" smtClean="0"/>
+                  <a:t>process with closing and then contour filling</a:t>
                 </a:r>
               </a:p>
               <a:p>
@@ -4597,23 +4778,18 @@
                   <a:t>f pixel is in background </a:t>
                 </a:r>
                 <a:r>
-                  <a:rPr lang="en-US" dirty="0" err="1" smtClean="0"/>
-                  <a:t>background</a:t>
+                  <a:rPr lang="en-US" dirty="0" smtClean="0"/>
+                  <a:t>=&gt;</a:t>
                 </a:r>
                 <a:r>
                   <a:rPr lang="en-US" dirty="0" smtClean="0"/>
-                  <a:t> adopt fast (big </a:t>
+                  <a:t> adopt </a:t>
                 </a:r>
-                <a14:m>
-                  <m:oMath xmlns:m="http://schemas.openxmlformats.org/officeDocument/2006/math">
-                    <m:r>
-                      <a:rPr lang="en-US" b="0" i="1" smtClean="0">
-                        <a:latin typeface="Cambria Math" panose="02040503050406030204" pitchFamily="18" charset="0"/>
-                      </a:rPr>
-                      <m:t>𝛼</m:t>
-                    </m:r>
-                  </m:oMath>
-                </a14:m>
+                <a:r>
+                  <a:rPr lang="en-US" dirty="0" smtClean="0"/>
+                  <a:t>fast (big </a:t>
+                </a:r>
+                <a14:m/>
                 <a:r>
                   <a:rPr lang="en-US" dirty="0" smtClean="0"/>
                   <a:t>)</a:t>
@@ -4623,7 +4799,15 @@
                 <a:pPr lvl="2"/>
                 <a:r>
                   <a:rPr lang="en-US" dirty="0" smtClean="0"/>
-                  <a:t>else foreground adopt slow</a:t>
+                  <a:t>else </a:t>
+                </a:r>
+                <a:r>
+                  <a:rPr lang="en-US" dirty="0" smtClean="0"/>
+                  <a:t>foreground =&gt; </a:t>
+                </a:r>
+                <a:r>
+                  <a:rPr lang="en-US" dirty="0" smtClean="0"/>
+                  <a:t>adopt slow</a:t>
                 </a:r>
               </a:p>
               <a:p>
@@ -4644,10 +4828,10 @@
               </p:nvPr>
             </p:nvSpPr>
             <p:spPr>
-              <a:blipFill rotWithShape="0">
+              <a:blipFill rotWithShape="1">
                 <a:blip r:embed="rId3"/>
                 <a:stretch>
-                  <a:fillRect l="-941" t="-2246"/>
+                  <a:fillRect/>
                 </a:stretch>
               </a:blipFill>
             </p:spPr>
@@ -4738,7 +4922,7 @@
   <p:timing>
     <p:tnLst>
       <p:par>
-        <p:cTn id="1" dur="indefinite" restart="never" nodeType="tmRoot"/>
+        <p:cTn xmlns:p14="http://schemas.microsoft.com/office/powerpoint/2010/main" id="1" dur="indefinite" restart="never" nodeType="tmRoot"/>
       </p:par>
     </p:tnLst>
   </p:timing>
@@ -4860,11 +5044,11 @@
           <a:lstStyle/>
           <a:p>
             <a:r>
-              <a:rPr lang="en-US" dirty="0" smtClean="0"/>
+              <a:rPr lang="en-US" dirty="0"/>
               <a:t>[1] </a:t>
             </a:r>
             <a:r>
-              <a:rPr lang="en-US" dirty="0" err="1" smtClean="0"/>
+              <a:rPr lang="en-US" dirty="0" err="1"/>
               <a:t>Barnich</a:t>
             </a:r>
             <a:r>
@@ -4885,11 +5069,22 @@
             </a:r>
             <a:r>
               <a:rPr lang="en-US" dirty="0"/>
-              <a:t>: A universal background subtraction algorithm for video sequences." </a:t>
-            </a:r>
+              <a:t>: A universal background subtraction algorithm for video sequences.” </a:t>
+            </a:r>
+            <a:br>
+              <a:rPr lang="en-US" dirty="0"/>
+            </a:br>
             <a:r>
               <a:rPr lang="en-US" i="1" dirty="0"/>
-              <a:t>Image Processing, IEEE Transactions on</a:t>
+              <a:t>IEEE Transactions on</a:t>
+            </a:r>
+            <a:r>
+              <a:rPr lang="en-US" dirty="0"/>
+              <a:t> </a:t>
+            </a:r>
+            <a:r>
+              <a:rPr lang="en-US" i="1" dirty="0"/>
+              <a:t>Image Processing, </a:t>
             </a:r>
             <a:r>
               <a:rPr lang="en-US" dirty="0"/>
@@ -4923,7 +5118,15 @@
             <a:pPr lvl="1"/>
             <a:r>
               <a:rPr lang="en-US" dirty="0" smtClean="0"/>
-              <a:t>Histogram of last n samples (n=20 in our case, n=1 also possible)</a:t>
+              <a:t>Per pixel sample </a:t>
+            </a:r>
+            <a:r>
+              <a:rPr lang="en-US" dirty="0"/>
+              <a:t>N</a:t>
+            </a:r>
+            <a:r>
+              <a:rPr lang="en-US" dirty="0" smtClean="0"/>
+              <a:t> values (N=20 in our implementation)</a:t>
             </a:r>
             <a:endParaRPr lang="en-US" dirty="0"/>
           </a:p>
@@ -4937,51 +5140,51 @@
             <a:pPr lvl="1"/>
             <a:r>
               <a:rPr lang="en-US" dirty="0" smtClean="0"/>
-              <a:t>If pixel value lies in histogram  =&gt; background</a:t>
-            </a:r>
+              <a:t>Count samples inside radius R</a:t>
+            </a:r>
+            <a:endParaRPr lang="en-US" dirty="0" smtClean="0"/>
           </a:p>
           <a:p>
             <a:pPr lvl="1"/>
             <a:r>
               <a:rPr lang="en-US" dirty="0" smtClean="0"/>
-              <a:t>Else foreground (Marko ???)</a:t>
-            </a:r>
+              <a:t>If more than q, then background (q=3)</a:t>
+            </a:r>
+            <a:endParaRPr lang="en-US" dirty="0" smtClean="0"/>
           </a:p>
           <a:p>
             <a:r>
               <a:rPr lang="en-US" dirty="0" smtClean="0"/>
-              <a:t>Model update</a:t>
-            </a:r>
+              <a:t>Model </a:t>
+            </a:r>
+            <a:r>
+              <a:rPr lang="en-US" dirty="0" smtClean="0"/>
+              <a:t>update (for background pixels)</a:t>
+            </a:r>
+            <a:endParaRPr lang="en-US" dirty="0" smtClean="0"/>
           </a:p>
           <a:p>
             <a:pPr lvl="1"/>
             <a:r>
               <a:rPr lang="en-US" dirty="0" smtClean="0"/>
-              <a:t>If background replace one of the sample randomly</a:t>
-            </a:r>
+              <a:t>Random chance to replace random sample for pixel</a:t>
+            </a:r>
+            <a:endParaRPr lang="en-US" dirty="0" smtClean="0"/>
           </a:p>
           <a:p>
             <a:pPr lvl="1"/>
             <a:r>
               <a:rPr lang="en-US" dirty="0" smtClean="0"/>
-              <a:t>Also replace random sample in </a:t>
-            </a:r>
-            <a:r>
-              <a:rPr lang="en-US" dirty="0" err="1" smtClean="0"/>
-              <a:t>neighbourhood</a:t>
+              <a:t>Also random chance to replace random pixel</a:t>
+            </a:r>
+            <a:br>
+              <a:rPr lang="en-US" dirty="0" smtClean="0"/>
+            </a:br>
+            <a:r>
+              <a:rPr lang="en-US" dirty="0" smtClean="0"/>
+              <a:t>in neighborhood.</a:t>
             </a:r>
             <a:endParaRPr lang="en-US" dirty="0" smtClean="0"/>
-          </a:p>
-          <a:p>
-            <a:pPr lvl="1"/>
-            <a:r>
-              <a:rPr lang="en-US" dirty="0" smtClean="0"/>
-              <a:t>Randomly replace some samples of the whole pic </a:t>
-            </a:r>
-          </a:p>
-          <a:p>
-            <a:pPr lvl="1"/>
-            <a:endParaRPr lang="en-US" dirty="0"/>
           </a:p>
         </p:txBody>
       </p:sp>
@@ -5001,7 +5204,7 @@
         </p:blipFill>
         <p:spPr>
           <a:xfrm>
-            <a:off x="7348151" y="2650812"/>
+            <a:off x="7482301" y="2641868"/>
             <a:ext cx="4167702" cy="2949585"/>
           </a:xfrm>
           <a:prstGeom prst="rect">
@@ -5022,7 +5225,7 @@
   <p:timing>
     <p:tnLst>
       <p:par>
-        <p:cTn id="1" dur="indefinite" restart="never" nodeType="tmRoot"/>
+        <p:cTn xmlns:p14="http://schemas.microsoft.com/office/powerpoint/2010/main" id="1" dur="indefinite" restart="never" nodeType="tmRoot"/>
       </p:par>
     </p:tnLst>
   </p:timing>
@@ -5144,11 +5347,11 @@
           <a:lstStyle/>
           <a:p>
             <a:r>
-              <a:rPr lang="en-US" dirty="0" smtClean="0"/>
+              <a:rPr lang="en-US" dirty="0"/>
               <a:t>[1] </a:t>
             </a:r>
             <a:r>
-              <a:rPr lang="en-US" dirty="0" err="1" smtClean="0"/>
+              <a:rPr lang="en-US" dirty="0" err="1"/>
               <a:t>Barnich</a:t>
             </a:r>
             <a:r>
@@ -5169,11 +5372,22 @@
             </a:r>
             <a:r>
               <a:rPr lang="en-US" dirty="0"/>
-              <a:t>: A universal background subtraction algorithm for video sequences." </a:t>
-            </a:r>
+              <a:t>: A universal background subtraction algorithm for video sequences.” </a:t>
+            </a:r>
+            <a:br>
+              <a:rPr lang="en-US" dirty="0"/>
+            </a:br>
             <a:r>
               <a:rPr lang="en-US" i="1" dirty="0"/>
-              <a:t>Image Processing, IEEE Transactions on</a:t>
+              <a:t>IEEE Transactions on</a:t>
+            </a:r>
+            <a:r>
+              <a:rPr lang="en-US" dirty="0"/>
+              <a:t> </a:t>
+            </a:r>
+            <a:r>
+              <a:rPr lang="en-US" i="1" dirty="0"/>
+              <a:t>Image Processing, </a:t>
             </a:r>
             <a:r>
               <a:rPr lang="en-US" dirty="0"/>
@@ -5248,86 +5462,7 @@
   <p:timing>
     <p:tnLst>
       <p:par>
-        <p:cTn id="1" dur="indefinite" restart="never" nodeType="tmRoot"/>
-      </p:par>
-    </p:tnLst>
-  </p:timing>
-</p:sld>
-</file>
-
-<file path=ppt/slides/slide6.xml><?xml version="1.0" encoding="utf-8"?>
-<p:sld xmlns:a="http://schemas.openxmlformats.org/drawingml/2006/main" xmlns:r="http://schemas.openxmlformats.org/officeDocument/2006/relationships" xmlns:p="http://schemas.openxmlformats.org/presentationml/2006/main">
-  <p:cSld>
-    <p:spTree>
-      <p:nvGrpSpPr>
-        <p:cNvPr id="1" name=""/>
-        <p:cNvGrpSpPr/>
-        <p:nvPr/>
-      </p:nvGrpSpPr>
-      <p:grpSpPr>
-        <a:xfrm>
-          <a:off x="0" y="0"/>
-          <a:ext cx="0" cy="0"/>
-          <a:chOff x="0" y="0"/>
-          <a:chExt cx="0" cy="0"/>
-        </a:xfrm>
-      </p:grpSpPr>
-      <p:sp>
-        <p:nvSpPr>
-          <p:cNvPr id="7" name="Title 6"/>
-          <p:cNvSpPr>
-            <a:spLocks noGrp="1"/>
-          </p:cNvSpPr>
-          <p:nvPr>
-            <p:ph type="ctrTitle"/>
-          </p:nvPr>
-        </p:nvSpPr>
-        <p:spPr/>
-        <p:txBody>
-          <a:bodyPr/>
-          <a:lstStyle/>
-          <a:p>
-            <a:r>
-              <a:rPr lang="en-US" smtClean="0"/>
-              <a:t>Thank you</a:t>
-            </a:r>
-            <a:endParaRPr lang="en-US" dirty="0"/>
-          </a:p>
-        </p:txBody>
-      </p:sp>
-      <p:sp>
-        <p:nvSpPr>
-          <p:cNvPr id="8" name="Subtitle 7"/>
-          <p:cNvSpPr>
-            <a:spLocks noGrp="1"/>
-          </p:cNvSpPr>
-          <p:nvPr>
-            <p:ph type="subTitle" idx="1"/>
-          </p:nvPr>
-        </p:nvSpPr>
-        <p:spPr/>
-        <p:txBody>
-          <a:bodyPr/>
-          <a:lstStyle/>
-          <a:p>
-            <a:endParaRPr lang="en-US" dirty="0"/>
-          </a:p>
-        </p:txBody>
-      </p:sp>
-    </p:spTree>
-    <p:extLst>
-      <p:ext uri="{BB962C8B-B14F-4D97-AF65-F5344CB8AC3E}">
-        <p14:creationId xmlns:p14="http://schemas.microsoft.com/office/powerpoint/2010/main" val="1161520450"/>
-      </p:ext>
-    </p:extLst>
-  </p:cSld>
-  <p:clrMapOvr>
-    <a:masterClrMapping/>
-  </p:clrMapOvr>
-  <p:timing>
-    <p:tnLst>
-      <p:par>
-        <p:cTn id="1" dur="indefinite" restart="never" nodeType="tmRoot"/>
+        <p:cTn xmlns:p14="http://schemas.microsoft.com/office/powerpoint/2010/main" id="1" dur="indefinite" restart="never" nodeType="tmRoot"/>
       </p:par>
     </p:tnLst>
   </p:timing>
@@ -5377,7 +5512,7 @@
     </a:clrScheme>
     <a:fontScheme name="Office">
       <a:majorFont>
-        <a:latin typeface="Calibri Light" panose="020F0302020204030204"/>
+        <a:latin typeface="Calibri Light"/>
         <a:ea typeface=""/>
         <a:cs typeface=""/>
         <a:font script="Jpan" typeface="ＭＳ Ｐゴシック"/>
@@ -5412,7 +5547,7 @@
         <a:font script="Geor" typeface="Sylfaen"/>
       </a:majorFont>
       <a:minorFont>
-        <a:latin typeface="Calibri" panose="020F0502020204030204"/>
+        <a:latin typeface="Calibri"/>
         <a:ea typeface=""/>
         <a:cs typeface=""/>
         <a:font script="Jpan" typeface="ＭＳ Ｐゴシック"/>
@@ -5589,7 +5724,7 @@
   <a:extraClrSchemeLst/>
   <a:extLst>
     <a:ext uri="{05A4C25C-085E-4340-85A3-A5531E510DB2}">
-      <thm15:themeFamily xmlns:thm15="http://schemas.microsoft.com/office/thememl/2012/main" name="Office Theme" id="{62F939B6-93AF-4DB8-9C6B-D6C7DFDC589F}" vid="{4A3C46E8-61CC-4603-A589-7422A47A8E4A}"/>
+      <thm15:themeFamily xmlns:thm15="http://schemas.microsoft.com/office/thememl/2012/main" xmlns="" name="Office Theme" id="{62F939B6-93AF-4DB8-9C6B-D6C7DFDC589F}" vid="{4A3C46E8-61CC-4603-A589-7422A47A8E4A}"/>
     </a:ext>
   </a:extLst>
 </a:theme>
@@ -5638,7 +5773,7 @@
     </a:clrScheme>
     <a:fontScheme name="Office">
       <a:majorFont>
-        <a:latin typeface="Calibri Light" panose="020F0302020204030204"/>
+        <a:latin typeface="Calibri Light"/>
         <a:ea typeface=""/>
         <a:cs typeface=""/>
         <a:font script="Jpan" typeface="ＭＳ Ｐゴシック"/>
@@ -5673,7 +5808,7 @@
         <a:font script="Geor" typeface="Sylfaen"/>
       </a:majorFont>
       <a:minorFont>
-        <a:latin typeface="Calibri" panose="020F0502020204030204"/>
+        <a:latin typeface="Calibri"/>
         <a:ea typeface=""/>
         <a:cs typeface=""/>
         <a:font script="Jpan" typeface="ＭＳ Ｐゴシック"/>
@@ -5850,7 +5985,7 @@
   <a:extraClrSchemeLst/>
   <a:extLst>
     <a:ext uri="{05A4C25C-085E-4340-85A3-A5531E510DB2}">
-      <thm15:themeFamily xmlns:thm15="http://schemas.microsoft.com/office/thememl/2012/main" name="Office Theme" id="{62F939B6-93AF-4DB8-9C6B-D6C7DFDC589F}" vid="{4A3C46E8-61CC-4603-A589-7422A47A8E4A}"/>
+      <thm15:themeFamily xmlns:thm15="http://schemas.microsoft.com/office/thememl/2012/main" xmlns="" name="Office Theme" id="{62F939B6-93AF-4DB8-9C6B-D6C7DFDC589F}" vid="{4A3C46E8-61CC-4603-A589-7422A47A8E4A}"/>
     </a:ext>
   </a:extLst>
 </a:theme>

</xml_diff>